<commit_message>
changes in code and ppt
</commit_message>
<xml_diff>
--- a/FEE ST1/coursecraft.pptx
+++ b/FEE ST1/coursecraft.pptx
@@ -5,7 +5,7 @@
     <p:sldMasterId id="2147483648" r:id="rId1"/>
   </p:sldMasterIdLst>
   <p:notesMasterIdLst>
-    <p:notesMasterId r:id="rId11"/>
+    <p:notesMasterId r:id="rId10"/>
   </p:notesMasterIdLst>
   <p:sldIdLst>
     <p:sldId id="256" r:id="rId2"/>
@@ -14,9 +14,8 @@
     <p:sldId id="265" r:id="rId5"/>
     <p:sldId id="261" r:id="rId6"/>
     <p:sldId id="266" r:id="rId7"/>
-    <p:sldId id="262" r:id="rId8"/>
-    <p:sldId id="263" r:id="rId9"/>
-    <p:sldId id="264" r:id="rId10"/>
+    <p:sldId id="263" r:id="rId8"/>
+    <p:sldId id="264" r:id="rId9"/>
   </p:sldIdLst>
   <p:sldSz cx="9144000" cy="6858000" type="screen4x3"/>
   <p:notesSz cx="9144000" cy="6858000"/>
@@ -265,7 +264,7 @@
       </p15:sldGuideLst>
     </p:ext>
     <p:ext uri="GoogleSlidesCustomDataVersion2">
-      <go:slidesCustomData xmlns:go="http://customooxmlschemas.google.com/" xmlns:ahyp="http://schemas.microsoft.com/office/drawing/2018/hyperlinkcolor" xmlns:p15="http://schemas.microsoft.com/office/powerpoint/2012/main" xmlns:p14="http://schemas.microsoft.com/office/powerpoint/2010/main" xmlns:com="http://schemas.openxmlformats.org/drawingml/2006/compatibility" xmlns:pvml="urn:schemas-microsoft-com:office:powerpoint" xmlns:v="urn:schemas-microsoft-com:vml" xmlns:o="urn:schemas-microsoft-com:office:office" xmlns:dgm="http://schemas.openxmlformats.org/drawingml/2006/diagram" xmlns:c="http://schemas.openxmlformats.org/drawingml/2006/chart" xmlns:mv="urn:schemas-microsoft-com:mac:vml" xmlns:mc="http://schemas.openxmlformats.org/markup-compatibility/2006" xmlns="" r:id="rId31" roundtripDataSignature="AMtx7mijA+1eX66IXCUKd/m7FHR3xUNQkQ=="/>
+      <go:slidesCustomData xmlns="" xmlns:mc="http://schemas.openxmlformats.org/markup-compatibility/2006" xmlns:mv="urn:schemas-microsoft-com:mac:vml" xmlns:c="http://schemas.openxmlformats.org/drawingml/2006/chart" xmlns:dgm="http://schemas.openxmlformats.org/drawingml/2006/diagram" xmlns:o="urn:schemas-microsoft-com:office:office" xmlns:v="urn:schemas-microsoft-com:vml" xmlns:pvml="urn:schemas-microsoft-com:office:powerpoint" xmlns:com="http://schemas.openxmlformats.org/drawingml/2006/compatibility" xmlns:p14="http://schemas.microsoft.com/office/powerpoint/2010/main" xmlns:p15="http://schemas.microsoft.com/office/powerpoint/2012/main" xmlns:ahyp="http://schemas.microsoft.com/office/drawing/2018/hyperlinkcolor" xmlns:go="http://customooxmlschemas.google.com/" r:id="rId31" roundtripDataSignature="AMtx7mijA+1eX66IXCUKd/m7FHR3xUNQkQ=="/>
     </p:ext>
   </p:extLst>
 </p:presentation>
@@ -347,7 +346,7 @@
           <a:bodyPr/>
           <a:lstStyle/>
           <a:p>
-            <a:endParaRPr lang="en-US"/>
+            <a:endParaRPr lang="en-US" dirty="0"/>
           </a:p>
         </p:txBody>
       </p:sp>
@@ -932,7 +931,7 @@
                 <a:buFont typeface="Arial"/>
                 <a:buNone/>
               </a:pPr>
-              <a:endParaRPr sz="1800" b="0" i="0" u="none" strike="noStrike" cap="none">
+              <a:endParaRPr sz="1800" b="0" i="0" u="none" strike="noStrike" cap="none" dirty="0">
                 <a:solidFill>
                   <a:schemeClr val="dk1"/>
                 </a:solidFill>
@@ -1015,7 +1014,7 @@
                 <a:buFont typeface="Arial"/>
                 <a:buNone/>
               </a:pPr>
-              <a:endParaRPr sz="1800" b="0" i="0" u="none" strike="noStrike" cap="none">
+              <a:endParaRPr sz="1800" b="0" i="0" u="none" strike="noStrike" cap="none" dirty="0">
                 <a:solidFill>
                   <a:schemeClr val="lt1"/>
                 </a:solidFill>
@@ -1592,7 +1591,7 @@
             </a:lvl9pPr>
           </a:lstStyle>
           <a:p>
-            <a:endParaRPr/>
+            <a:endParaRPr dirty="0"/>
           </a:p>
         </p:txBody>
       </p:sp>
@@ -1756,7 +1755,7 @@
             </a:lvl9pPr>
           </a:lstStyle>
           <a:p>
-            <a:endParaRPr/>
+            <a:endParaRPr dirty="0"/>
           </a:p>
         </p:txBody>
       </p:sp>
@@ -2037,7 +2036,7 @@
               <a:rPr lang="en-US"/>
               <a:t>‹#›</a:t>
             </a:fld>
-            <a:endParaRPr/>
+            <a:endParaRPr dirty="0"/>
           </a:p>
         </p:txBody>
       </p:sp>
@@ -2226,7 +2225,7 @@
             </a:lvl9pPr>
           </a:lstStyle>
           <a:p>
-            <a:endParaRPr/>
+            <a:endParaRPr dirty="0"/>
           </a:p>
         </p:txBody>
       </p:sp>
@@ -2390,7 +2389,7 @@
             </a:lvl9pPr>
           </a:lstStyle>
           <a:p>
-            <a:endParaRPr/>
+            <a:endParaRPr dirty="0"/>
           </a:p>
         </p:txBody>
       </p:sp>
@@ -2671,7 +2670,7 @@
               <a:rPr lang="en-US"/>
               <a:t>‹#›</a:t>
             </a:fld>
-            <a:endParaRPr/>
+            <a:endParaRPr dirty="0"/>
           </a:p>
         </p:txBody>
       </p:sp>
@@ -3036,7 +3035,7 @@
             </a:lvl9pPr>
           </a:lstStyle>
           <a:p>
-            <a:endParaRPr/>
+            <a:endParaRPr dirty="0"/>
           </a:p>
         </p:txBody>
       </p:sp>
@@ -3200,7 +3199,7 @@
             </a:lvl9pPr>
           </a:lstStyle>
           <a:p>
-            <a:endParaRPr/>
+            <a:endParaRPr dirty="0"/>
           </a:p>
         </p:txBody>
       </p:sp>
@@ -3481,7 +3480,7 @@
               <a:rPr lang="en-US"/>
               <a:t>‹#›</a:t>
             </a:fld>
-            <a:endParaRPr/>
+            <a:endParaRPr dirty="0"/>
           </a:p>
         </p:txBody>
       </p:sp>
@@ -4098,7 +4097,7 @@
               <a:buFont typeface="Arial"/>
               <a:buNone/>
             </a:pPr>
-            <a:endParaRPr sz="1800" b="0" i="0" u="none" strike="noStrike" cap="none">
+            <a:endParaRPr sz="1800" b="0" i="0" u="none" strike="noStrike" cap="none" dirty="0">
               <a:solidFill>
                 <a:schemeClr val="dk1"/>
               </a:solidFill>
@@ -4154,7 +4153,7 @@
               <a:buFont typeface="Arial"/>
               <a:buNone/>
             </a:pPr>
-            <a:endParaRPr sz="1800" b="0" i="0" u="none" strike="noStrike" cap="none">
+            <a:endParaRPr sz="1800" b="0" i="0" u="none" strike="noStrike" cap="none" dirty="0">
               <a:solidFill>
                 <a:schemeClr val="dk1"/>
               </a:solidFill>
@@ -4278,7 +4277,7 @@
                 <a:buFont typeface="Arial"/>
                 <a:buNone/>
               </a:pPr>
-              <a:endParaRPr sz="1800" b="0" i="0" u="none" strike="noStrike" cap="none">
+              <a:endParaRPr sz="1800" b="0" i="0" u="none" strike="noStrike" cap="none" dirty="0">
                 <a:solidFill>
                   <a:schemeClr val="dk1"/>
                 </a:solidFill>
@@ -4361,7 +4360,7 @@
                 <a:buFont typeface="Arial"/>
                 <a:buNone/>
               </a:pPr>
-              <a:endParaRPr sz="1800" b="0" i="0" u="none" strike="noStrike" cap="none">
+              <a:endParaRPr sz="1800" b="0" i="0" u="none" strike="noStrike" cap="none" dirty="0">
                 <a:solidFill>
                   <a:schemeClr val="lt1"/>
                 </a:solidFill>
@@ -4665,7 +4664,7 @@
             </a:lvl9pPr>
           </a:lstStyle>
           <a:p>
-            <a:endParaRPr/>
+            <a:endParaRPr dirty="0"/>
           </a:p>
         </p:txBody>
       </p:sp>
@@ -4933,7 +4932,7 @@
             </a:lvl9pPr>
           </a:lstStyle>
           <a:p>
-            <a:endParaRPr/>
+            <a:endParaRPr dirty="0"/>
           </a:p>
         </p:txBody>
       </p:sp>
@@ -5214,7 +5213,7 @@
               <a:rPr lang="en-US"/>
               <a:t>‹#›</a:t>
             </a:fld>
-            <a:endParaRPr/>
+            <a:endParaRPr dirty="0"/>
           </a:p>
         </p:txBody>
       </p:sp>
@@ -5979,7 +5978,7 @@
               <a:buNone/>
             </a:pPr>
             <a:r>
-              <a:rPr lang="en-US" sz="4000" dirty="0" err="1"/>
+              <a:rPr lang="en-US" sz="4000" dirty="0"/>
               <a:t>CourseCraft</a:t>
             </a:r>
             <a:endParaRPr sz="4000" dirty="0">
@@ -6326,7 +6325,7 @@
               </a:spcBef>
             </a:pPr>
             <a:r>
-              <a:rPr lang="en-US" sz="2000" dirty="0"/>
+              <a:rPr lang="en-US" sz="2000"/>
               <a:t>Submitted to:</a:t>
             </a:r>
           </a:p>
@@ -6617,7 +6616,7 @@
               </a:spcBef>
             </a:pPr>
             <a:r>
-              <a:rPr lang="en-US" sz="2000" dirty="0"/>
+              <a:rPr lang="en-US" sz="2000"/>
               <a:t>Submitted by:</a:t>
             </a:r>
           </a:p>
@@ -6628,7 +6627,7 @@
               </a:spcBef>
             </a:pPr>
             <a:r>
-              <a:rPr lang="en-US" sz="2000" dirty="0"/>
+              <a:rPr lang="en-US" sz="2000"/>
               <a:t>Kartikya Sokhal- 2410990513</a:t>
             </a:r>
           </a:p>
@@ -6639,7 +6638,7 @@
               </a:spcBef>
             </a:pPr>
             <a:r>
-              <a:rPr lang="en-US" sz="2000" dirty="0"/>
+              <a:rPr lang="en-US" sz="2000"/>
               <a:t>Tanishq Chhabra - 2410990563</a:t>
             </a:r>
           </a:p>
@@ -6650,7 +6649,7 @@
               </a:spcBef>
             </a:pPr>
             <a:r>
-              <a:rPr lang="en-US" sz="2000" dirty="0"/>
+              <a:rPr lang="en-US" sz="2000"/>
               <a:t>Piyush Garg - 2410995 </a:t>
             </a:r>
           </a:p>
@@ -6661,42 +6660,12 @@
               </a:spcBef>
             </a:pPr>
             <a:r>
-              <a:rPr lang="en-US" sz="2000" dirty="0"/>
+              <a:rPr lang="en-US" sz="2000"/>
               <a:t>Neha Prashar - 2410990538</a:t>
             </a:r>
           </a:p>
         </p:txBody>
       </p:sp>
-      <p:pic>
-        <p:nvPicPr>
-          <p:cNvPr id="4" name="Picture 3">
-            <a:extLst>
-              <a:ext uri="{FF2B5EF4-FFF2-40B4-BE49-F238E27FC236}">
-                <a16:creationId xmlns:a16="http://schemas.microsoft.com/office/drawing/2014/main" id="{BC9E0DE1-7F13-F9A1-053F-5F34C0220C2C}"/>
-              </a:ext>
-            </a:extLst>
-          </p:cNvPr>
-          <p:cNvPicPr>
-            <a:picLocks noChangeAspect="1"/>
-          </p:cNvPicPr>
-          <p:nvPr/>
-        </p:nvPicPr>
-        <p:blipFill>
-          <a:blip r:embed="rId3"/>
-          <a:stretch>
-            <a:fillRect/>
-          </a:stretch>
-        </p:blipFill>
-        <p:spPr>
-          <a:xfrm>
-            <a:off x="2749663" y="1640055"/>
-            <a:ext cx="2747011" cy="2631705"/>
-          </a:xfrm>
-          <a:prstGeom prst="rect">
-            <a:avLst/>
-          </a:prstGeom>
-        </p:spPr>
-      </p:pic>
     </p:spTree>
   </p:cSld>
   <p:clrMapOvr>
@@ -6751,7 +6720,7 @@
           <a:lstStyle/>
           <a:p>
             <a:r>
-              <a:rPr lang="en-IN" sz="2800" dirty="0"/>
+              <a:rPr lang="en-IN" sz="2800"/>
               <a:t>INTRODUCTION</a:t>
             </a:r>
           </a:p>
@@ -6929,7 +6898,7 @@
           <a:lstStyle/>
           <a:p>
             <a:r>
-              <a:rPr lang="en-IN" sz="2800" dirty="0"/>
+              <a:rPr lang="en-IN" sz="2800"/>
               <a:t>HOME PAGE</a:t>
             </a:r>
           </a:p>
@@ -6982,10 +6951,10 @@
       </p:sp>
       <p:pic>
         <p:nvPicPr>
-          <p:cNvPr id="7" name="Picture 6">
+          <p:cNvPr id="4" name="Picture 3">
             <a:extLst>
               <a:ext uri="{FF2B5EF4-FFF2-40B4-BE49-F238E27FC236}">
-                <a16:creationId xmlns:a16="http://schemas.microsoft.com/office/drawing/2014/main" id="{3579F918-FB9C-FCB3-D63D-207895362660}"/>
+                <a16:creationId xmlns:a16="http://schemas.microsoft.com/office/drawing/2014/main" id="{FC3B986E-A01B-A965-E3B4-22FC18A14EE1}"/>
               </a:ext>
             </a:extLst>
           </p:cNvPr>
@@ -7002,8 +6971,8 @@
         </p:blipFill>
         <p:spPr>
           <a:xfrm>
-            <a:off x="395234" y="1194099"/>
-            <a:ext cx="8353532" cy="4199191"/>
+            <a:off x="401686" y="1097280"/>
+            <a:ext cx="8340627" cy="4305566"/>
           </a:xfrm>
           <a:prstGeom prst="rect">
             <a:avLst/>
@@ -7040,36 +7009,6 @@
           <a:chExt cx="0" cy="0"/>
         </a:xfrm>
       </p:grpSpPr>
-      <p:pic>
-        <p:nvPicPr>
-          <p:cNvPr id="3" name="Picture 2">
-            <a:extLst>
-              <a:ext uri="{FF2B5EF4-FFF2-40B4-BE49-F238E27FC236}">
-                <a16:creationId xmlns:a16="http://schemas.microsoft.com/office/drawing/2014/main" id="{E8F58E2C-B848-562B-6964-1882D11932FD}"/>
-              </a:ext>
-            </a:extLst>
-          </p:cNvPr>
-          <p:cNvPicPr>
-            <a:picLocks noChangeAspect="1"/>
-          </p:cNvPicPr>
-          <p:nvPr/>
-        </p:nvPicPr>
-        <p:blipFill>
-          <a:blip r:embed="rId2"/>
-          <a:stretch>
-            <a:fillRect/>
-          </a:stretch>
-        </p:blipFill>
-        <p:spPr>
-          <a:xfrm>
-            <a:off x="47240" y="1126857"/>
-            <a:ext cx="9049520" cy="4001858"/>
-          </a:xfrm>
-          <a:prstGeom prst="rect">
-            <a:avLst/>
-          </a:prstGeom>
-        </p:spPr>
-      </p:pic>
       <p:sp>
         <p:nvSpPr>
           <p:cNvPr id="6" name="TextBox 5">
@@ -7099,7 +7038,7 @@
           <a:lstStyle/>
           <a:p>
             <a:r>
-              <a:rPr lang="en-IN" sz="2800" dirty="0"/>
+              <a:rPr lang="en-IN" sz="2800"/>
               <a:t>FEATURES</a:t>
             </a:r>
           </a:p>
@@ -7156,6 +7095,36 @@
           </a:p>
         </p:txBody>
       </p:sp>
+      <p:pic>
+        <p:nvPicPr>
+          <p:cNvPr id="4" name="Picture 3">
+            <a:extLst>
+              <a:ext uri="{FF2B5EF4-FFF2-40B4-BE49-F238E27FC236}">
+                <a16:creationId xmlns:a16="http://schemas.microsoft.com/office/drawing/2014/main" id="{BEAC4C32-F371-6EB8-224C-049CAEF9C05E}"/>
+              </a:ext>
+            </a:extLst>
+          </p:cNvPr>
+          <p:cNvPicPr>
+            <a:picLocks noChangeAspect="1"/>
+          </p:cNvPicPr>
+          <p:nvPr/>
+        </p:nvPicPr>
+        <p:blipFill>
+          <a:blip r:embed="rId2"/>
+          <a:stretch>
+            <a:fillRect/>
+          </a:stretch>
+        </p:blipFill>
+        <p:spPr>
+          <a:xfrm>
+            <a:off x="323699" y="1032734"/>
+            <a:ext cx="8274350" cy="4173588"/>
+          </a:xfrm>
+          <a:prstGeom prst="rect">
+            <a:avLst/>
+          </a:prstGeom>
+        </p:spPr>
+      </p:pic>
     </p:spTree>
     <p:extLst>
       <p:ext uri="{BB962C8B-B14F-4D97-AF65-F5344CB8AC3E}">
@@ -7200,7 +7169,7 @@
         </p:nvSpPr>
         <p:spPr>
           <a:xfrm>
-            <a:off x="82193" y="164387"/>
+            <a:off x="232800" y="185903"/>
             <a:ext cx="4099389" cy="523220"/>
           </a:xfrm>
           <a:prstGeom prst="rect">
@@ -7216,17 +7185,64 @@
           <a:p>
             <a:r>
               <a:rPr lang="en-IN" sz="2800" dirty="0"/>
-              <a:t>EVENTS PAGE</a:t>
+              <a:t>COURSE GENERATE</a:t>
             </a:r>
+          </a:p>
+        </p:txBody>
+      </p:sp>
+      <p:sp>
+        <p:nvSpPr>
+          <p:cNvPr id="7" name="TextBox 6">
+            <a:extLst>
+              <a:ext uri="{FF2B5EF4-FFF2-40B4-BE49-F238E27FC236}">
+                <a16:creationId xmlns:a16="http://schemas.microsoft.com/office/drawing/2014/main" id="{89D2315C-FD0C-B409-D087-1901E5022E06}"/>
+              </a:ext>
+            </a:extLst>
+          </p:cNvPr>
+          <p:cNvSpPr txBox="1"/>
+          <p:nvPr/>
+        </p:nvSpPr>
+        <p:spPr>
+          <a:xfrm>
+            <a:off x="443818" y="5337418"/>
+            <a:ext cx="8467382" cy="1156086"/>
+          </a:xfrm>
+          <a:prstGeom prst="rect">
+            <a:avLst/>
+          </a:prstGeom>
+          <a:noFill/>
+        </p:spPr>
+        <p:txBody>
+          <a:bodyPr wrap="square" rtlCol="0">
+            <a:spAutoFit/>
+          </a:bodyPr>
+          <a:lstStyle/>
+          <a:p>
+            <a:pPr algn="just">
+              <a:lnSpc>
+                <a:spcPct val="150000"/>
+              </a:lnSpc>
+            </a:pPr>
+            <a:r>
+              <a:rPr lang="en-CA" sz="1600" dirty="0">
+                <a:latin typeface="Times New Roman" panose="02020603050405020304" pitchFamily="18" charset="0"/>
+                <a:cs typeface="Times New Roman" panose="02020603050405020304" pitchFamily="18" charset="0"/>
+              </a:rPr>
+              <a:t>Our platform allows users to generate customized courses by simply entering their topic, goals, and skill level (Beginner, Intermediate, Advanced). This makes it easier for learners to instantly create structured learning paths that match their needs.</a:t>
+            </a:r>
+            <a:endParaRPr lang="en-IN" sz="1600" dirty="0">
+              <a:latin typeface="Times New Roman" panose="02020603050405020304" pitchFamily="18" charset="0"/>
+              <a:cs typeface="Times New Roman" panose="02020603050405020304" pitchFamily="18" charset="0"/>
+            </a:endParaRPr>
           </a:p>
         </p:txBody>
       </p:sp>
       <p:pic>
         <p:nvPicPr>
-          <p:cNvPr id="4" name="Picture 3">
+          <p:cNvPr id="3" name="Picture 2">
             <a:extLst>
               <a:ext uri="{FF2B5EF4-FFF2-40B4-BE49-F238E27FC236}">
-                <a16:creationId xmlns:a16="http://schemas.microsoft.com/office/drawing/2014/main" id="{EDC0F5E3-0C94-3AAE-D6BD-ECDAF0139448}"/>
+                <a16:creationId xmlns:a16="http://schemas.microsoft.com/office/drawing/2014/main" id="{8D2AB488-20AA-8C43-8E5A-6C16F7309BF0}"/>
               </a:ext>
             </a:extLst>
           </p:cNvPr>
@@ -7243,63 +7259,14 @@
         </p:blipFill>
         <p:spPr>
           <a:xfrm>
-            <a:off x="762417" y="1181528"/>
-            <a:ext cx="7619165" cy="4037744"/>
+            <a:off x="363753" y="1050112"/>
+            <a:ext cx="8336429" cy="4287306"/>
           </a:xfrm>
           <a:prstGeom prst="rect">
             <a:avLst/>
           </a:prstGeom>
         </p:spPr>
       </p:pic>
-      <p:sp>
-        <p:nvSpPr>
-          <p:cNvPr id="7" name="TextBox 6">
-            <a:extLst>
-              <a:ext uri="{FF2B5EF4-FFF2-40B4-BE49-F238E27FC236}">
-                <a16:creationId xmlns:a16="http://schemas.microsoft.com/office/drawing/2014/main" id="{89D2315C-FD0C-B409-D087-1901E5022E06}"/>
-              </a:ext>
-            </a:extLst>
-          </p:cNvPr>
-          <p:cNvSpPr txBox="1"/>
-          <p:nvPr/>
-        </p:nvSpPr>
-        <p:spPr>
-          <a:xfrm>
-            <a:off x="762417" y="5337418"/>
-            <a:ext cx="7539102" cy="1154675"/>
-          </a:xfrm>
-          <a:prstGeom prst="rect">
-            <a:avLst/>
-          </a:prstGeom>
-          <a:noFill/>
-        </p:spPr>
-        <p:txBody>
-          <a:bodyPr wrap="square" rtlCol="0">
-            <a:spAutoFit/>
-          </a:bodyPr>
-          <a:lstStyle/>
-          <a:p>
-            <a:pPr algn="just">
-              <a:lnSpc>
-                <a:spcPct val="150000"/>
-              </a:lnSpc>
-            </a:pPr>
-            <a:r>
-              <a:rPr lang="en-US" sz="1600" dirty="0"/>
-              <a:t>Our platform brings various kind events together in one </a:t>
-            </a:r>
-            <a:r>
-              <a:rPr lang="en-US" sz="1600" dirty="0" err="1"/>
-              <a:t>place.Which</a:t>
-            </a:r>
-            <a:r>
-              <a:rPr lang="en-US" sz="1600" dirty="0"/>
-              <a:t> makes it easier for student to check all the events in one place and also can decide which event is suitable for them</a:t>
-            </a:r>
-            <a:endParaRPr lang="en-IN" sz="1600" dirty="0"/>
-          </a:p>
-        </p:txBody>
-      </p:sp>
     </p:spTree>
     <p:extLst>
       <p:ext uri="{BB962C8B-B14F-4D97-AF65-F5344CB8AC3E}">
@@ -7332,10 +7299,10 @@
       </p:grpSpPr>
       <p:pic>
         <p:nvPicPr>
-          <p:cNvPr id="2" name="Picture 1">
+          <p:cNvPr id="3" name="Picture 2">
             <a:extLst>
               <a:ext uri="{FF2B5EF4-FFF2-40B4-BE49-F238E27FC236}">
-                <a16:creationId xmlns:a16="http://schemas.microsoft.com/office/drawing/2014/main" id="{F5EFBF3E-11E0-0029-3BD1-34F4E9C45221}"/>
+                <a16:creationId xmlns:a16="http://schemas.microsoft.com/office/drawing/2014/main" id="{893349D5-719E-307F-1EAD-B48F00F91B55}"/>
               </a:ext>
             </a:extLst>
           </p:cNvPr>
@@ -7352,14 +7319,96 @@
         </p:blipFill>
         <p:spPr>
           <a:xfrm>
-            <a:off x="462879" y="1169840"/>
-            <a:ext cx="8218242" cy="4518320"/>
+            <a:off x="459888" y="1137422"/>
+            <a:ext cx="8415170" cy="4309931"/>
           </a:xfrm>
           <a:prstGeom prst="rect">
             <a:avLst/>
           </a:prstGeom>
         </p:spPr>
       </p:pic>
+      <p:sp>
+        <p:nvSpPr>
+          <p:cNvPr id="5" name="TextBox 4">
+            <a:extLst>
+              <a:ext uri="{FF2B5EF4-FFF2-40B4-BE49-F238E27FC236}">
+                <a16:creationId xmlns:a16="http://schemas.microsoft.com/office/drawing/2014/main" id="{B9917655-9873-3724-5701-0B6A75425775}"/>
+              </a:ext>
+            </a:extLst>
+          </p:cNvPr>
+          <p:cNvSpPr txBox="1"/>
+          <p:nvPr/>
+        </p:nvSpPr>
+        <p:spPr>
+          <a:xfrm>
+            <a:off x="632011" y="5903458"/>
+            <a:ext cx="8415170" cy="584775"/>
+          </a:xfrm>
+          <a:prstGeom prst="rect">
+            <a:avLst/>
+          </a:prstGeom>
+          <a:noFill/>
+        </p:spPr>
+        <p:txBody>
+          <a:bodyPr wrap="square">
+            <a:spAutoFit/>
+          </a:bodyPr>
+          <a:lstStyle/>
+          <a:p>
+            <a:r>
+              <a:rPr lang="en-CA" sz="1600" i="0" u="none" strike="noStrike" dirty="0">
+                <a:solidFill>
+                  <a:srgbClr val="000000"/>
+                </a:solidFill>
+                <a:effectLst/>
+                <a:latin typeface="Times New Roman" panose="02020603050405020304" pitchFamily="18" charset="0"/>
+                <a:cs typeface="Times New Roman" panose="02020603050405020304" pitchFamily="18" charset="0"/>
+              </a:rPr>
+              <a:t>CourseCraft offers both Light and Dark themes – switch anytime for a comfortable learning experience.</a:t>
+            </a:r>
+            <a:endParaRPr lang="en-US" sz="1600" dirty="0">
+              <a:latin typeface="Times New Roman" panose="02020603050405020304" pitchFamily="18" charset="0"/>
+              <a:cs typeface="Times New Roman" panose="02020603050405020304" pitchFamily="18" charset="0"/>
+            </a:endParaRPr>
+          </a:p>
+        </p:txBody>
+      </p:sp>
+      <p:sp>
+        <p:nvSpPr>
+          <p:cNvPr id="7" name="TextBox 6">
+            <a:extLst>
+              <a:ext uri="{FF2B5EF4-FFF2-40B4-BE49-F238E27FC236}">
+                <a16:creationId xmlns:a16="http://schemas.microsoft.com/office/drawing/2014/main" id="{B7C2715B-AC25-56EE-92F5-BBE3026C7C98}"/>
+              </a:ext>
+            </a:extLst>
+          </p:cNvPr>
+          <p:cNvSpPr txBox="1"/>
+          <p:nvPr/>
+        </p:nvSpPr>
+        <p:spPr>
+          <a:xfrm>
+            <a:off x="232800" y="185903"/>
+            <a:ext cx="4941628" cy="523220"/>
+          </a:xfrm>
+          <a:prstGeom prst="rect">
+            <a:avLst/>
+          </a:prstGeom>
+          <a:noFill/>
+        </p:spPr>
+        <p:txBody>
+          <a:bodyPr wrap="square" rtlCol="0">
+            <a:spAutoFit/>
+          </a:bodyPr>
+          <a:lstStyle/>
+          <a:p>
+            <a:r>
+              <a:rPr lang="en-CA" sz="2800" dirty="0"/>
+              <a:t>PERSONALISED THEME</a:t>
+            </a:r>
+            <a:endParaRPr lang="en-IN" sz="2800" dirty="0"/>
+          </a:p>
+        </p:txBody>
+      </p:sp>
     </p:spTree>
     <p:extLst>
       <p:ext uri="{BB962C8B-B14F-4D97-AF65-F5344CB8AC3E}">
@@ -7374,142 +7423,6 @@
 </file>
 
 <file path=ppt/slides/slide7.xml><?xml version="1.0" encoding="utf-8"?>
-<p:sld xmlns:a="http://schemas.openxmlformats.org/drawingml/2006/main" xmlns:r="http://schemas.openxmlformats.org/officeDocument/2006/relationships" xmlns:p="http://schemas.openxmlformats.org/presentationml/2006/main">
-  <p:cSld>
-    <p:spTree>
-      <p:nvGrpSpPr>
-        <p:cNvPr id="1" name=""/>
-        <p:cNvGrpSpPr/>
-        <p:nvPr/>
-      </p:nvGrpSpPr>
-      <p:grpSpPr>
-        <a:xfrm>
-          <a:off x="0" y="0"/>
-          <a:ext cx="0" cy="0"/>
-          <a:chOff x="0" y="0"/>
-          <a:chExt cx="0" cy="0"/>
-        </a:xfrm>
-      </p:grpSpPr>
-      <p:sp>
-        <p:nvSpPr>
-          <p:cNvPr id="2" name="TextBox 1">
-            <a:extLst>
-              <a:ext uri="{FF2B5EF4-FFF2-40B4-BE49-F238E27FC236}">
-                <a16:creationId xmlns:a16="http://schemas.microsoft.com/office/drawing/2014/main" id="{689C3F89-0AEC-C34F-1C8F-35636FBB7E2E}"/>
-              </a:ext>
-            </a:extLst>
-          </p:cNvPr>
-          <p:cNvSpPr txBox="1"/>
-          <p:nvPr/>
-        </p:nvSpPr>
-        <p:spPr>
-          <a:xfrm>
-            <a:off x="164387" y="154113"/>
-            <a:ext cx="4315146" cy="523220"/>
-          </a:xfrm>
-          <a:prstGeom prst="rect">
-            <a:avLst/>
-          </a:prstGeom>
-          <a:noFill/>
-        </p:spPr>
-        <p:txBody>
-          <a:bodyPr wrap="square" rtlCol="0">
-            <a:spAutoFit/>
-          </a:bodyPr>
-          <a:lstStyle/>
-          <a:p>
-            <a:r>
-              <a:rPr lang="en-IN" sz="2800" dirty="0"/>
-              <a:t>CLUBS PAGE</a:t>
-            </a:r>
-          </a:p>
-        </p:txBody>
-      </p:sp>
-      <p:pic>
-        <p:nvPicPr>
-          <p:cNvPr id="10" name="Picture 9">
-            <a:extLst>
-              <a:ext uri="{FF2B5EF4-FFF2-40B4-BE49-F238E27FC236}">
-                <a16:creationId xmlns:a16="http://schemas.microsoft.com/office/drawing/2014/main" id="{BF756F5C-0DA1-969C-D00B-544F04C3F3C9}"/>
-              </a:ext>
-            </a:extLst>
-          </p:cNvPr>
-          <p:cNvPicPr>
-            <a:picLocks noChangeAspect="1"/>
-          </p:cNvPicPr>
-          <p:nvPr/>
-        </p:nvPicPr>
-        <p:blipFill>
-          <a:blip r:embed="rId2"/>
-          <a:stretch>
-            <a:fillRect/>
-          </a:stretch>
-        </p:blipFill>
-        <p:spPr>
-          <a:xfrm>
-            <a:off x="659655" y="1151766"/>
-            <a:ext cx="7784600" cy="4365455"/>
-          </a:xfrm>
-          <a:prstGeom prst="rect">
-            <a:avLst/>
-          </a:prstGeom>
-        </p:spPr>
-      </p:pic>
-      <p:sp>
-        <p:nvSpPr>
-          <p:cNvPr id="11" name="TextBox 10">
-            <a:extLst>
-              <a:ext uri="{FF2B5EF4-FFF2-40B4-BE49-F238E27FC236}">
-                <a16:creationId xmlns:a16="http://schemas.microsoft.com/office/drawing/2014/main" id="{8A620CBC-A32B-D290-B5A1-D408F25083F4}"/>
-              </a:ext>
-            </a:extLst>
-          </p:cNvPr>
-          <p:cNvSpPr txBox="1"/>
-          <p:nvPr/>
-        </p:nvSpPr>
-        <p:spPr>
-          <a:xfrm>
-            <a:off x="659654" y="5706233"/>
-            <a:ext cx="7784600" cy="785343"/>
-          </a:xfrm>
-          <a:prstGeom prst="rect">
-            <a:avLst/>
-          </a:prstGeom>
-          <a:noFill/>
-        </p:spPr>
-        <p:txBody>
-          <a:bodyPr wrap="square" rtlCol="0">
-            <a:spAutoFit/>
-          </a:bodyPr>
-          <a:lstStyle/>
-          <a:p>
-            <a:pPr algn="just">
-              <a:lnSpc>
-                <a:spcPct val="150000"/>
-              </a:lnSpc>
-            </a:pPr>
-            <a:r>
-              <a:rPr lang="en-US" sz="1600" dirty="0"/>
-              <a:t>Our website connects students through different clubs that match their interests and can register for the events of that particular club. </a:t>
-            </a:r>
-            <a:endParaRPr lang="en-IN" sz="1600" dirty="0"/>
-          </a:p>
-        </p:txBody>
-      </p:sp>
-    </p:spTree>
-    <p:extLst>
-      <p:ext uri="{BB962C8B-B14F-4D97-AF65-F5344CB8AC3E}">
-        <p14:creationId xmlns:p14="http://schemas.microsoft.com/office/powerpoint/2010/main" val="1867164252"/>
-      </p:ext>
-    </p:extLst>
-  </p:cSld>
-  <p:clrMapOvr>
-    <a:masterClrMapping/>
-  </p:clrMapOvr>
-</p:sld>
-</file>
-
-<file path=ppt/slides/slide8.xml><?xml version="1.0" encoding="utf-8"?>
 <p:sld xmlns:a="http://schemas.openxmlformats.org/drawingml/2006/main" xmlns:r="http://schemas.openxmlformats.org/officeDocument/2006/relationships" xmlns:p="http://schemas.openxmlformats.org/presentationml/2006/main">
   <p:cSld>
     <p:spTree>
@@ -7561,12 +7474,72 @@
           </a:p>
         </p:txBody>
       </p:sp>
+      <p:sp>
+        <p:nvSpPr>
+          <p:cNvPr id="5" name="TextBox 4">
+            <a:extLst>
+              <a:ext uri="{FF2B5EF4-FFF2-40B4-BE49-F238E27FC236}">
+                <a16:creationId xmlns:a16="http://schemas.microsoft.com/office/drawing/2014/main" id="{58239C53-2C58-6514-6B60-554DFF0F99EF}"/>
+              </a:ext>
+            </a:extLst>
+          </p:cNvPr>
+          <p:cNvSpPr txBox="1"/>
+          <p:nvPr/>
+        </p:nvSpPr>
+        <p:spPr>
+          <a:xfrm>
+            <a:off x="313802" y="5337112"/>
+            <a:ext cx="8516395" cy="1156086"/>
+          </a:xfrm>
+          <a:prstGeom prst="rect">
+            <a:avLst/>
+          </a:prstGeom>
+          <a:noFill/>
+        </p:spPr>
+        <p:txBody>
+          <a:bodyPr wrap="square" rtlCol="0">
+            <a:spAutoFit/>
+          </a:bodyPr>
+          <a:lstStyle/>
+          <a:p>
+            <a:pPr algn="just">
+              <a:lnSpc>
+                <a:spcPct val="150000"/>
+              </a:lnSpc>
+            </a:pPr>
+            <a:r>
+              <a:rPr lang="en-CA" sz="1600" dirty="0">
+                <a:latin typeface="Times New Roman" panose="02020603050405020304" pitchFamily="18" charset="0"/>
+                <a:cs typeface="Times New Roman" panose="02020603050405020304" pitchFamily="18" charset="0"/>
+              </a:rPr>
+              <a:t>CourseCraft is an AI-powered platform that makes learning simple and personalized.</a:t>
+            </a:r>
+            <a:br>
+              <a:rPr lang="en-CA" sz="1600" dirty="0">
+                <a:latin typeface="Times New Roman" panose="02020603050405020304" pitchFamily="18" charset="0"/>
+                <a:cs typeface="Times New Roman" panose="02020603050405020304" pitchFamily="18" charset="0"/>
+              </a:rPr>
+            </a:br>
+            <a:r>
+              <a:rPr lang="en-CA" sz="1600" dirty="0">
+                <a:latin typeface="Times New Roman" panose="02020603050405020304" pitchFamily="18" charset="0"/>
+                <a:cs typeface="Times New Roman" panose="02020603050405020304" pitchFamily="18" charset="0"/>
+              </a:rPr>
+              <a:t>It helps users create structured courses instantly, provides tailored learning paths, and ensures education is accessible, engaging, and efficient.</a:t>
+            </a:r>
+            <a:endParaRPr lang="en-IN" sz="1600" dirty="0">
+              <a:latin typeface="Times New Roman" panose="02020603050405020304" pitchFamily="18" charset="0"/>
+              <a:cs typeface="Times New Roman" panose="02020603050405020304" pitchFamily="18" charset="0"/>
+            </a:endParaRPr>
+          </a:p>
+        </p:txBody>
+      </p:sp>
       <p:pic>
         <p:nvPicPr>
-          <p:cNvPr id="4" name="Picture 3">
+          <p:cNvPr id="3" name="Picture 2">
             <a:extLst>
               <a:ext uri="{FF2B5EF4-FFF2-40B4-BE49-F238E27FC236}">
-                <a16:creationId xmlns:a16="http://schemas.microsoft.com/office/drawing/2014/main" id="{8ED446DC-46FF-4038-07C9-27BCD79B5134}"/>
+                <a16:creationId xmlns:a16="http://schemas.microsoft.com/office/drawing/2014/main" id="{E5EEFA66-675B-5196-CDFF-867AAFE783D1}"/>
               </a:ext>
             </a:extLst>
           </p:cNvPr>
@@ -7583,55 +7556,14 @@
         </p:blipFill>
         <p:spPr>
           <a:xfrm>
-            <a:off x="769574" y="1036956"/>
-            <a:ext cx="7604852" cy="4314795"/>
+            <a:off x="358663" y="989703"/>
+            <a:ext cx="8426672" cy="4347409"/>
           </a:xfrm>
           <a:prstGeom prst="rect">
             <a:avLst/>
           </a:prstGeom>
         </p:spPr>
       </p:pic>
-      <p:sp>
-        <p:nvSpPr>
-          <p:cNvPr id="5" name="TextBox 4">
-            <a:extLst>
-              <a:ext uri="{FF2B5EF4-FFF2-40B4-BE49-F238E27FC236}">
-                <a16:creationId xmlns:a16="http://schemas.microsoft.com/office/drawing/2014/main" id="{58239C53-2C58-6514-6B60-554DFF0F99EF}"/>
-              </a:ext>
-            </a:extLst>
-          </p:cNvPr>
-          <p:cNvSpPr txBox="1"/>
-          <p:nvPr/>
-        </p:nvSpPr>
-        <p:spPr>
-          <a:xfrm>
-            <a:off x="769574" y="5423699"/>
-            <a:ext cx="7604852" cy="1154675"/>
-          </a:xfrm>
-          <a:prstGeom prst="rect">
-            <a:avLst/>
-          </a:prstGeom>
-          <a:noFill/>
-        </p:spPr>
-        <p:txBody>
-          <a:bodyPr wrap="square" rtlCol="0">
-            <a:spAutoFit/>
-          </a:bodyPr>
-          <a:lstStyle/>
-          <a:p>
-            <a:pPr algn="just">
-              <a:lnSpc>
-                <a:spcPct val="150000"/>
-              </a:lnSpc>
-            </a:pPr>
-            <a:r>
-              <a:rPr lang="en-US" sz="1600" dirty="0"/>
-              <a:t>We bring students, clubs, and organizers together on one platform to manage events simple and fun. Our aim is to build a friendly community where everyone can get knowledge about the event.</a:t>
-            </a:r>
-            <a:endParaRPr lang="en-IN" sz="1600" dirty="0"/>
-          </a:p>
-        </p:txBody>
-      </p:sp>
     </p:spTree>
     <p:extLst>
       <p:ext uri="{BB962C8B-B14F-4D97-AF65-F5344CB8AC3E}">
@@ -7645,7 +7577,7 @@
 </p:sld>
 </file>
 
-<file path=ppt/slides/slide9.xml><?xml version="1.0" encoding="utf-8"?>
+<file path=ppt/slides/slide8.xml><?xml version="1.0" encoding="utf-8"?>
 <p:sld xmlns:a="http://schemas.openxmlformats.org/drawingml/2006/main" xmlns:r="http://schemas.openxmlformats.org/officeDocument/2006/relationships" xmlns:p="http://schemas.openxmlformats.org/presentationml/2006/main">
   <p:cSld>
     <p:spTree>

</xml_diff>